<commit_message>
update IOT presentation file
</commit_message>
<xml_diff>
--- a/session6/presentation/Internet_Of_Things.pptx
+++ b/session6/presentation/Internet_Of_Things.pptx
@@ -283,7 +283,7 @@
           <a:p>
             <a:fld id="{1139FA4A-C808-4981-8BA9-64217A6CCEA7}" type="datetimeFigureOut">
               <a:rPr lang="en-US" smtClean="0"/>
-              <a:t>3/26/2018</a:t>
+              <a:t>5/31/2018</a:t>
             </a:fld>
             <a:endParaRPr lang="en-US"/>
           </a:p>
@@ -451,7 +451,7 @@
           <a:p>
             <a:fld id="{1139FA4A-C808-4981-8BA9-64217A6CCEA7}" type="datetimeFigureOut">
               <a:rPr lang="en-US" smtClean="0"/>
-              <a:t>3/26/2018</a:t>
+              <a:t>5/31/2018</a:t>
             </a:fld>
             <a:endParaRPr lang="en-US"/>
           </a:p>
@@ -629,7 +629,7 @@
           <a:p>
             <a:fld id="{1139FA4A-C808-4981-8BA9-64217A6CCEA7}" type="datetimeFigureOut">
               <a:rPr lang="en-US" smtClean="0"/>
-              <a:t>3/26/2018</a:t>
+              <a:t>5/31/2018</a:t>
             </a:fld>
             <a:endParaRPr lang="en-US"/>
           </a:p>
@@ -797,7 +797,7 @@
           <a:p>
             <a:fld id="{1139FA4A-C808-4981-8BA9-64217A6CCEA7}" type="datetimeFigureOut">
               <a:rPr lang="en-US" smtClean="0"/>
-              <a:t>3/26/2018</a:t>
+              <a:t>5/31/2018</a:t>
             </a:fld>
             <a:endParaRPr lang="en-US"/>
           </a:p>
@@ -1042,7 +1042,7 @@
           <a:p>
             <a:fld id="{1139FA4A-C808-4981-8BA9-64217A6CCEA7}" type="datetimeFigureOut">
               <a:rPr lang="en-US" smtClean="0"/>
-              <a:t>3/26/2018</a:t>
+              <a:t>5/31/2018</a:t>
             </a:fld>
             <a:endParaRPr lang="en-US"/>
           </a:p>
@@ -1271,7 +1271,7 @@
           <a:p>
             <a:fld id="{1139FA4A-C808-4981-8BA9-64217A6CCEA7}" type="datetimeFigureOut">
               <a:rPr lang="en-US" smtClean="0"/>
-              <a:t>3/26/2018</a:t>
+              <a:t>5/31/2018</a:t>
             </a:fld>
             <a:endParaRPr lang="en-US"/>
           </a:p>
@@ -1635,7 +1635,7 @@
           <a:p>
             <a:fld id="{1139FA4A-C808-4981-8BA9-64217A6CCEA7}" type="datetimeFigureOut">
               <a:rPr lang="en-US" smtClean="0"/>
-              <a:t>3/26/2018</a:t>
+              <a:t>5/31/2018</a:t>
             </a:fld>
             <a:endParaRPr lang="en-US"/>
           </a:p>
@@ -1752,7 +1752,7 @@
           <a:p>
             <a:fld id="{1139FA4A-C808-4981-8BA9-64217A6CCEA7}" type="datetimeFigureOut">
               <a:rPr lang="en-US" smtClean="0"/>
-              <a:t>3/26/2018</a:t>
+              <a:t>5/31/2018</a:t>
             </a:fld>
             <a:endParaRPr lang="en-US"/>
           </a:p>
@@ -1847,7 +1847,7 @@
           <a:p>
             <a:fld id="{1139FA4A-C808-4981-8BA9-64217A6CCEA7}" type="datetimeFigureOut">
               <a:rPr lang="en-US" smtClean="0"/>
-              <a:t>3/26/2018</a:t>
+              <a:t>5/31/2018</a:t>
             </a:fld>
             <a:endParaRPr lang="en-US"/>
           </a:p>
@@ -2122,7 +2122,7 @@
           <a:p>
             <a:fld id="{1139FA4A-C808-4981-8BA9-64217A6CCEA7}" type="datetimeFigureOut">
               <a:rPr lang="en-US" smtClean="0"/>
-              <a:t>3/26/2018</a:t>
+              <a:t>5/31/2018</a:t>
             </a:fld>
             <a:endParaRPr lang="en-US"/>
           </a:p>
@@ -2374,7 +2374,7 @@
           <a:p>
             <a:fld id="{1139FA4A-C808-4981-8BA9-64217A6CCEA7}" type="datetimeFigureOut">
               <a:rPr lang="en-US" smtClean="0"/>
-              <a:t>3/26/2018</a:t>
+              <a:t>5/31/2018</a:t>
             </a:fld>
             <a:endParaRPr lang="en-US"/>
           </a:p>
@@ -2585,7 +2585,7 @@
           <a:p>
             <a:fld id="{1139FA4A-C808-4981-8BA9-64217A6CCEA7}" type="datetimeFigureOut">
               <a:rPr lang="en-US" smtClean="0"/>
-              <a:t>3/26/2018</a:t>
+              <a:t>5/31/2018</a:t>
             </a:fld>
             <a:endParaRPr lang="en-US"/>
           </a:p>
@@ -11698,7 +11698,7 @@
         <p:spPr>
           <a:xfrm>
             <a:off x="417443" y="745199"/>
-            <a:ext cx="11357113" cy="4093428"/>
+            <a:ext cx="11357113" cy="3785652"/>
           </a:xfrm>
           <a:prstGeom prst="rect">
             <a:avLst/>
@@ -11869,11 +11869,26 @@
                 </a:solidFill>
                 <a:latin typeface="Consolas" panose="020B0609020204030204" pitchFamily="49" charset="0"/>
               </a:rPr>
-              <a:t>	status = 'Raspberry Pi getting hot. </a:t>
-            </a:r>
-          </a:p>
-          <a:p>
-            <a:pPr lvl="1"/>
+              <a:t>	status = 'Raspberry Pi </a:t>
+            </a:r>
+            <a:r>
+              <a:rPr lang="en-US" sz="2000" b="1" i="1">
+                <a:solidFill>
+                  <a:srgbClr val="0070C0"/>
+                </a:solidFill>
+                <a:latin typeface="Consolas" panose="020B0609020204030204" pitchFamily="49" charset="0"/>
+              </a:rPr>
+              <a:t>getting </a:t>
+            </a:r>
+            <a:r>
+              <a:rPr lang="en-US" sz="2000" b="1" i="1" smtClean="0">
+                <a:solidFill>
+                  <a:srgbClr val="0070C0"/>
+                </a:solidFill>
+                <a:latin typeface="Consolas" panose="020B0609020204030204" pitchFamily="49" charset="0"/>
+              </a:rPr>
+              <a:t>hot. CPU </a:t>
+            </a:r>
             <a:r>
               <a:rPr lang="en-US" sz="2000" b="1" i="1" dirty="0">
                 <a:solidFill>
@@ -11881,7 +11896,7 @@
                 </a:solidFill>
                 <a:latin typeface="Consolas" panose="020B0609020204030204" pitchFamily="49" charset="0"/>
               </a:rPr>
-              <a:t>	CPU temp=' + temp    </a:t>
+              <a:t>temp=' + temp    </a:t>
             </a:r>
           </a:p>
           <a:p>
@@ -12004,6 +12019,13 @@
   <p:clrMapOvr>
     <a:masterClrMapping/>
   </p:clrMapOvr>
+  <p:timing>
+    <p:tnLst>
+      <p:par>
+        <p:cTn id="1" dur="indefinite" restart="never" nodeType="tmRoot"/>
+      </p:par>
+    </p:tnLst>
+  </p:timing>
 </p:sld>
 </file>
 
@@ -13066,6 +13088,13 @@
   <p:clrMapOvr>
     <a:masterClrMapping/>
   </p:clrMapOvr>
+  <p:timing>
+    <p:tnLst>
+      <p:par>
+        <p:cTn id="1" dur="indefinite" restart="never" nodeType="tmRoot"/>
+      </p:par>
+    </p:tnLst>
+  </p:timing>
 </p:sld>
 </file>
 
@@ -13445,6 +13474,13 @@
   <p:clrMapOvr>
     <a:masterClrMapping/>
   </p:clrMapOvr>
+  <p:timing>
+    <p:tnLst>
+      <p:par>
+        <p:cTn id="1" dur="indefinite" restart="never" nodeType="tmRoot"/>
+      </p:par>
+    </p:tnLst>
+  </p:timing>
 </p:sld>
 </file>
 

</xml_diff>